<commit_message>
Updated ppt and certificate. :)
</commit_message>
<xml_diff>
--- a/Documents/First Presentation.pptx
+++ b/Documents/First Presentation.pptx
@@ -346,10 +346,10 @@
                 <c:formatCode>General</c:formatCode>
                 <c:ptCount val="30"/>
                 <c:pt idx="0">
-                  <c:v>99.047620000001686</c:v>
+                  <c:v>99.047620000001729</c:v>
                 </c:pt>
                 <c:pt idx="1">
-                  <c:v>99.047620000001686</c:v>
+                  <c:v>99.047620000001729</c:v>
                 </c:pt>
                 <c:pt idx="2">
                   <c:v>99.28570999999998</c:v>
@@ -361,7 +361,7 @@
                   <c:v>99.28570999999998</c:v>
                 </c:pt>
                 <c:pt idx="5">
-                  <c:v>99.047620000001686</c:v>
+                  <c:v>99.047620000001729</c:v>
                 </c:pt>
                 <c:pt idx="6">
                   <c:v>99.523809999999983</c:v>
@@ -388,10 +388,10 @@
                   <c:v>98.333335999999989</c:v>
                 </c:pt>
                 <c:pt idx="14">
-                  <c:v>99.047620000001686</c:v>
+                  <c:v>99.047620000001729</c:v>
                 </c:pt>
                 <c:pt idx="15">
-                  <c:v>99.047620000001686</c:v>
+                  <c:v>99.047620000001729</c:v>
                 </c:pt>
                 <c:pt idx="16">
                   <c:v>98.333335999999989</c:v>
@@ -403,7 +403,7 @@
                   <c:v>99.28570999999998</c:v>
                 </c:pt>
                 <c:pt idx="19">
-                  <c:v>99.047620000001686</c:v>
+                  <c:v>99.047620000001729</c:v>
                 </c:pt>
                 <c:pt idx="20">
                   <c:v>98.333335999999989</c:v>
@@ -418,13 +418,13 @@
                   <c:v>98.333335999999989</c:v>
                 </c:pt>
                 <c:pt idx="24">
-                  <c:v>99.047620000001686</c:v>
+                  <c:v>99.047620000001729</c:v>
                 </c:pt>
                 <c:pt idx="25">
                   <c:v>98.571429999999992</c:v>
                 </c:pt>
                 <c:pt idx="26">
-                  <c:v>99.047620000001686</c:v>
+                  <c:v>99.047620000001729</c:v>
                 </c:pt>
                 <c:pt idx="27">
                   <c:v>99.28570999999998</c:v>
@@ -577,7 +577,7 @@
                   <c:v>98.809524999999994</c:v>
                 </c:pt>
                 <c:pt idx="1">
-                  <c:v>99.047620000001686</c:v>
+                  <c:v>99.047620000001729</c:v>
                 </c:pt>
                 <c:pt idx="2">
                   <c:v>99.28570999999998</c:v>
@@ -586,16 +586,16 @@
                   <c:v>98.571429999999992</c:v>
                 </c:pt>
                 <c:pt idx="4">
-                  <c:v>99.047620000001686</c:v>
+                  <c:v>99.047620000001729</c:v>
                 </c:pt>
                 <c:pt idx="5">
                   <c:v>98.333335999999989</c:v>
                 </c:pt>
                 <c:pt idx="6">
-                  <c:v>99.047620000001686</c:v>
+                  <c:v>99.047620000001729</c:v>
                 </c:pt>
                 <c:pt idx="7">
-                  <c:v>99.047620000001686</c:v>
+                  <c:v>99.047620000001729</c:v>
                 </c:pt>
                 <c:pt idx="8">
                   <c:v>99.523809999999983</c:v>
@@ -613,7 +613,7 @@
                   <c:v>98.571429999999992</c:v>
                 </c:pt>
                 <c:pt idx="13">
-                  <c:v>99.047620000001686</c:v>
+                  <c:v>99.047620000001729</c:v>
                 </c:pt>
                 <c:pt idx="14">
                   <c:v>98.809524999999994</c:v>
@@ -628,10 +628,10 @@
                   <c:v>98.809524999999994</c:v>
                 </c:pt>
                 <c:pt idx="18">
-                  <c:v>99.047620000001686</c:v>
+                  <c:v>99.047620000001729</c:v>
                 </c:pt>
                 <c:pt idx="19">
-                  <c:v>99.047620000001686</c:v>
+                  <c:v>99.047620000001729</c:v>
                 </c:pt>
                 <c:pt idx="20">
                   <c:v>98.571429999999992</c:v>
@@ -668,11 +668,11 @@
           </c:val>
         </c:ser>
         <c:marker val="1"/>
-        <c:axId val="55214080"/>
-        <c:axId val="55215616"/>
+        <c:axId val="54435840"/>
+        <c:axId val="54437376"/>
       </c:lineChart>
       <c:catAx>
-        <c:axId val="55214080"/>
+        <c:axId val="54435840"/>
         <c:scaling>
           <c:orientation val="minMax"/>
         </c:scaling>
@@ -688,14 +688,14 @@
             <a:endParaRPr lang="en-US"/>
           </a:p>
         </c:txPr>
-        <c:crossAx val="55215616"/>
+        <c:crossAx val="54437376"/>
         <c:crosses val="autoZero"/>
         <c:auto val="1"/>
         <c:lblAlgn val="ctr"/>
         <c:lblOffset val="100"/>
       </c:catAx>
       <c:valAx>
-        <c:axId val="55215616"/>
+        <c:axId val="54437376"/>
         <c:scaling>
           <c:orientation val="minMax"/>
         </c:scaling>
@@ -713,7 +713,7 @@
             <a:endParaRPr lang="en-US"/>
           </a:p>
         </c:txPr>
-        <c:crossAx val="55214080"/>
+        <c:crossAx val="54435840"/>
         <c:crosses val="autoZero"/>
         <c:crossBetween val="between"/>
       </c:valAx>
@@ -1190,11 +1190,11 @@
           </c:val>
         </c:ser>
         <c:marker val="1"/>
-        <c:axId val="56766464"/>
-        <c:axId val="56768000"/>
+        <c:axId val="65355776"/>
+        <c:axId val="65357312"/>
       </c:lineChart>
       <c:catAx>
-        <c:axId val="56766464"/>
+        <c:axId val="65355776"/>
         <c:scaling>
           <c:orientation val="minMax"/>
         </c:scaling>
@@ -1210,14 +1210,14 @@
             <a:endParaRPr lang="en-US"/>
           </a:p>
         </c:txPr>
-        <c:crossAx val="56768000"/>
+        <c:crossAx val="65357312"/>
         <c:crosses val="autoZero"/>
         <c:auto val="1"/>
         <c:lblAlgn val="ctr"/>
         <c:lblOffset val="100"/>
       </c:catAx>
       <c:valAx>
-        <c:axId val="56768000"/>
+        <c:axId val="65357312"/>
         <c:scaling>
           <c:orientation val="minMax"/>
         </c:scaling>
@@ -1235,7 +1235,7 @@
             <a:endParaRPr lang="en-US"/>
           </a:p>
         </c:txPr>
-        <c:crossAx val="56766464"/>
+        <c:crossAx val="65355776"/>
         <c:crosses val="autoZero"/>
         <c:crossBetween val="between"/>
       </c:valAx>
@@ -1304,10 +1304,10 @@
                 <c:formatCode>General</c:formatCode>
                 <c:ptCount val="30"/>
                 <c:pt idx="0">
-                  <c:v>99.047620000001615</c:v>
+                  <c:v>99.047620000001658</c:v>
                 </c:pt>
                 <c:pt idx="1">
-                  <c:v>99.047620000001615</c:v>
+                  <c:v>99.047620000001658</c:v>
                 </c:pt>
                 <c:pt idx="2">
                   <c:v>99.28570999999998</c:v>
@@ -1319,7 +1319,7 @@
                   <c:v>99.28570999999998</c:v>
                 </c:pt>
                 <c:pt idx="5">
-                  <c:v>99.047620000001615</c:v>
+                  <c:v>99.047620000001658</c:v>
                 </c:pt>
                 <c:pt idx="6">
                   <c:v>99.523809999999983</c:v>
@@ -1346,10 +1346,10 @@
                   <c:v>98.333335999999989</c:v>
                 </c:pt>
                 <c:pt idx="14">
-                  <c:v>99.047620000001615</c:v>
+                  <c:v>99.047620000001658</c:v>
                 </c:pt>
                 <c:pt idx="15">
-                  <c:v>99.047620000001615</c:v>
+                  <c:v>99.047620000001658</c:v>
                 </c:pt>
                 <c:pt idx="16">
                   <c:v>98.333335999999989</c:v>
@@ -1361,7 +1361,7 @@
                   <c:v>99.28570999999998</c:v>
                 </c:pt>
                 <c:pt idx="19">
-                  <c:v>99.047620000001615</c:v>
+                  <c:v>99.047620000001658</c:v>
                 </c:pt>
                 <c:pt idx="20">
                   <c:v>98.333335999999989</c:v>
@@ -1376,13 +1376,13 @@
                   <c:v>98.333335999999989</c:v>
                 </c:pt>
                 <c:pt idx="24">
-                  <c:v>99.047620000001615</c:v>
+                  <c:v>99.047620000001658</c:v>
                 </c:pt>
                 <c:pt idx="25">
                   <c:v>98.571429999999992</c:v>
                 </c:pt>
                 <c:pt idx="26">
-                  <c:v>99.047620000001615</c:v>
+                  <c:v>99.047620000001658</c:v>
                 </c:pt>
                 <c:pt idx="27">
                   <c:v>99.28570999999998</c:v>
@@ -1437,7 +1437,7 @@
                   <c:v>99.523809999999983</c:v>
                 </c:pt>
                 <c:pt idx="9">
-                  <c:v>99.047620000001615</c:v>
+                  <c:v>99.047620000001658</c:v>
                 </c:pt>
                 <c:pt idx="10">
                   <c:v>99.28570999999998</c:v>
@@ -1716,11 +1716,11 @@
           </c:val>
         </c:ser>
         <c:marker val="1"/>
-        <c:axId val="56791424"/>
-        <c:axId val="56792960"/>
+        <c:axId val="65405312"/>
+        <c:axId val="65406848"/>
       </c:lineChart>
       <c:catAx>
-        <c:axId val="56791424"/>
+        <c:axId val="65405312"/>
         <c:scaling>
           <c:orientation val="minMax"/>
         </c:scaling>
@@ -1736,14 +1736,14 @@
             <a:endParaRPr lang="en-US"/>
           </a:p>
         </c:txPr>
-        <c:crossAx val="56792960"/>
+        <c:crossAx val="65406848"/>
         <c:crosses val="autoZero"/>
         <c:auto val="1"/>
         <c:lblAlgn val="ctr"/>
         <c:lblOffset val="100"/>
       </c:catAx>
       <c:valAx>
-        <c:axId val="56792960"/>
+        <c:axId val="65406848"/>
         <c:scaling>
           <c:orientation val="minMax"/>
         </c:scaling>
@@ -1761,7 +1761,7 @@
             <a:endParaRPr lang="en-US"/>
           </a:p>
         </c:txPr>
-        <c:crossAx val="56791424"/>
+        <c:crossAx val="65405312"/>
         <c:crosses val="autoZero"/>
         <c:crossBetween val="between"/>
       </c:valAx>
@@ -2243,11 +2243,11 @@
           </c:val>
         </c:ser>
         <c:marker val="1"/>
-        <c:axId val="56583296"/>
-        <c:axId val="56584832"/>
+        <c:axId val="56587392"/>
+        <c:axId val="56588928"/>
       </c:lineChart>
       <c:catAx>
-        <c:axId val="56583296"/>
+        <c:axId val="56587392"/>
         <c:scaling>
           <c:orientation val="minMax"/>
         </c:scaling>
@@ -2263,14 +2263,14 @@
             <a:endParaRPr lang="en-US"/>
           </a:p>
         </c:txPr>
-        <c:crossAx val="56584832"/>
+        <c:crossAx val="56588928"/>
         <c:crosses val="autoZero"/>
         <c:auto val="1"/>
         <c:lblAlgn val="ctr"/>
         <c:lblOffset val="100"/>
       </c:catAx>
       <c:valAx>
-        <c:axId val="56584832"/>
+        <c:axId val="56588928"/>
         <c:scaling>
           <c:orientation val="minMax"/>
         </c:scaling>
@@ -2288,7 +2288,7 @@
             <a:endParaRPr lang="en-US"/>
           </a:p>
         </c:txPr>
-        <c:crossAx val="56583296"/>
+        <c:crossAx val="56587392"/>
         <c:crosses val="autoZero"/>
         <c:crossBetween val="between"/>
       </c:valAx>
@@ -2871,11 +2871,11 @@
           </c:val>
         </c:ser>
         <c:marker val="1"/>
-        <c:axId val="57080064"/>
-        <c:axId val="56954880"/>
+        <c:axId val="65665280"/>
+        <c:axId val="65540096"/>
       </c:lineChart>
       <c:catAx>
-        <c:axId val="57080064"/>
+        <c:axId val="65665280"/>
         <c:scaling>
           <c:orientation val="minMax"/>
         </c:scaling>
@@ -2891,14 +2891,14 @@
             <a:endParaRPr lang="en-US"/>
           </a:p>
         </c:txPr>
-        <c:crossAx val="56954880"/>
+        <c:crossAx val="65540096"/>
         <c:crosses val="autoZero"/>
         <c:auto val="1"/>
         <c:lblAlgn val="ctr"/>
         <c:lblOffset val="100"/>
       </c:catAx>
       <c:valAx>
-        <c:axId val="56954880"/>
+        <c:axId val="65540096"/>
         <c:scaling>
           <c:orientation val="minMax"/>
         </c:scaling>
@@ -2916,7 +2916,7 @@
             <a:endParaRPr lang="en-US"/>
           </a:p>
         </c:txPr>
-        <c:crossAx val="57080064"/>
+        <c:crossAx val="65665280"/>
         <c:crosses val="autoZero"/>
         <c:crossBetween val="between"/>
       </c:valAx>
@@ -6028,7 +6028,7 @@
             <a:fld id="{5909FCD0-2036-4A26-B196-21D0D9AEC838}" type="datetimeFigureOut">
               <a:rPr lang="en-US" smtClean="0"/>
               <a:pPr/>
-              <a:t>2/16/2014</a:t>
+              <a:t>2/24/2014</a:t>
             </a:fld>
             <a:endParaRPr lang="en-PH"/>
           </a:p>
@@ -6640,7 +6640,7 @@
             <a:fld id="{E8BAF1B1-FBAD-42AC-9F83-E5F02759BB7F}" type="datetime1">
               <a:rPr lang="en-US" smtClean="0"/>
               <a:pPr/>
-              <a:t>2/16/2014</a:t>
+              <a:t>2/24/2014</a:t>
             </a:fld>
             <a:endParaRPr lang="en-PH"/>
           </a:p>
@@ -6810,7 +6810,7 @@
             <a:fld id="{82510A61-2553-4478-9908-57B9E763D74F}" type="datetime1">
               <a:rPr lang="en-US" smtClean="0"/>
               <a:pPr/>
-              <a:t>2/16/2014</a:t>
+              <a:t>2/24/2014</a:t>
             </a:fld>
             <a:endParaRPr lang="en-PH"/>
           </a:p>
@@ -6990,7 +6990,7 @@
             <a:fld id="{7D1D668B-35DD-48D1-BFB1-10277D70EFD3}" type="datetime1">
               <a:rPr lang="en-US" smtClean="0"/>
               <a:pPr/>
-              <a:t>2/16/2014</a:t>
+              <a:t>2/24/2014</a:t>
             </a:fld>
             <a:endParaRPr lang="en-PH"/>
           </a:p>
@@ -7160,7 +7160,7 @@
             <a:fld id="{28584B8E-1E69-4145-9928-7D6BC016322B}" type="datetime1">
               <a:rPr lang="en-US" smtClean="0"/>
               <a:pPr/>
-              <a:t>2/16/2014</a:t>
+              <a:t>2/24/2014</a:t>
             </a:fld>
             <a:endParaRPr lang="en-PH"/>
           </a:p>
@@ -7406,7 +7406,7 @@
             <a:fld id="{375C55BB-1CD7-4E5A-9934-7458E7D068FC}" type="datetime1">
               <a:rPr lang="en-US" smtClean="0"/>
               <a:pPr/>
-              <a:t>2/16/2014</a:t>
+              <a:t>2/24/2014</a:t>
             </a:fld>
             <a:endParaRPr lang="en-PH"/>
           </a:p>
@@ -7694,7 +7694,7 @@
             <a:fld id="{9C4DABDB-686C-47DC-9AFD-385E6803F88A}" type="datetime1">
               <a:rPr lang="en-US" smtClean="0"/>
               <a:pPr/>
-              <a:t>2/16/2014</a:t>
+              <a:t>2/24/2014</a:t>
             </a:fld>
             <a:endParaRPr lang="en-PH"/>
           </a:p>
@@ -8116,7 +8116,7 @@
             <a:fld id="{CB3E338F-3D22-4778-865F-92755C9E7C38}" type="datetime1">
               <a:rPr lang="en-US" smtClean="0"/>
               <a:pPr/>
-              <a:t>2/16/2014</a:t>
+              <a:t>2/24/2014</a:t>
             </a:fld>
             <a:endParaRPr lang="en-PH"/>
           </a:p>
@@ -8234,7 +8234,7 @@
             <a:fld id="{BBA24CBF-4956-4B1F-BFC9-5298533859D1}" type="datetime1">
               <a:rPr lang="en-US" smtClean="0"/>
               <a:pPr/>
-              <a:t>2/16/2014</a:t>
+              <a:t>2/24/2014</a:t>
             </a:fld>
             <a:endParaRPr lang="en-PH"/>
           </a:p>
@@ -8329,7 +8329,7 @@
             <a:fld id="{3DA68A9E-4919-4748-A14F-9CE408058CE3}" type="datetime1">
               <a:rPr lang="en-US" smtClean="0"/>
               <a:pPr/>
-              <a:t>2/16/2014</a:t>
+              <a:t>2/24/2014</a:t>
             </a:fld>
             <a:endParaRPr lang="en-PH"/>
           </a:p>
@@ -8606,7 +8606,7 @@
             <a:fld id="{9D0114FD-2E0E-4DF4-AE3A-119A9E5171C1}" type="datetime1">
               <a:rPr lang="en-US" smtClean="0"/>
               <a:pPr/>
-              <a:t>2/16/2014</a:t>
+              <a:t>2/24/2014</a:t>
             </a:fld>
             <a:endParaRPr lang="en-PH"/>
           </a:p>
@@ -8859,7 +8859,7 @@
             <a:fld id="{503937D6-4983-41F6-8CCC-96769FAA579A}" type="datetime1">
               <a:rPr lang="en-US" smtClean="0"/>
               <a:pPr/>
-              <a:t>2/16/2014</a:t>
+              <a:t>2/24/2014</a:t>
             </a:fld>
             <a:endParaRPr lang="en-PH"/>
           </a:p>
@@ -9079,7 +9079,7 @@
             <a:fld id="{17442B52-D966-4F9F-92BB-458151582366}" type="datetime1">
               <a:rPr lang="en-US" smtClean="0"/>
               <a:pPr/>
-              <a:t>2/16/2014</a:t>
+              <a:t>2/24/2014</a:t>
             </a:fld>
             <a:endParaRPr lang="en-PH"/>
           </a:p>
@@ -9637,37 +9637,7 @@
                 <a:uFillTx/>
                 <a:cs typeface="Consolas" pitchFamily="49" charset="0"/>
               </a:rPr>
-              <a:t>February 26</a:t>
-            </a:r>
-            <a:r>
-              <a:rPr kumimoji="0" lang="en-PH" sz="2000" b="0" i="0" strike="noStrike" kern="1200" cap="none" spc="0" normalizeH="0" baseline="0" noProof="0" dirty="0" smtClean="0">
-                <a:ln>
-                  <a:noFill/>
-                </a:ln>
-                <a:solidFill>
-                  <a:schemeClr val="tx1"/>
-                </a:solidFill>
-                <a:effectLst/>
-                <a:uLnTx/>
-                <a:uFillTx/>
-                <a:cs typeface="Consolas" pitchFamily="49" charset="0"/>
-              </a:rPr>
-              <a:t>, </a:t>
-            </a:r>
-            <a:r>
-              <a:rPr kumimoji="0" lang="en-PH" sz="2000" b="0" i="0" strike="noStrike" kern="1200" cap="none" spc="0" normalizeH="0" baseline="0" noProof="0" dirty="0" smtClean="0">
-                <a:ln>
-                  <a:noFill/>
-                </a:ln>
-                <a:solidFill>
-                  <a:schemeClr val="tx1"/>
-                </a:solidFill>
-                <a:effectLst/>
-                <a:uLnTx/>
-                <a:uFillTx/>
-                <a:cs typeface="Consolas" pitchFamily="49" charset="0"/>
-              </a:rPr>
-              <a:t>2014</a:t>
+              <a:t>February 26, 2014</a:t>
             </a:r>
             <a:endParaRPr kumimoji="0" lang="en-PH" sz="2000" b="0" i="0" strike="noStrike" kern="1200" cap="none" spc="0" normalizeH="0" baseline="0" noProof="0" dirty="0">
               <a:ln>
@@ -11327,14 +11297,7 @@
                 <a:latin typeface="Segoe UI" pitchFamily="34" charset="0"/>
                 <a:cs typeface="Segoe UI" pitchFamily="34" charset="0"/>
               </a:rPr>
-              <a:t>manipulation </a:t>
-            </a:r>
-            <a:r>
-              <a:rPr lang="en-PH" dirty="0" smtClean="0">
-                <a:latin typeface="Segoe UI" pitchFamily="34" charset="0"/>
-                <a:cs typeface="Segoe UI" pitchFamily="34" charset="0"/>
-              </a:rPr>
-              <a:t>of an image</a:t>
+              <a:t>manipulation of an image</a:t>
             </a:r>
           </a:p>
           <a:p>
@@ -11353,14 +11316,7 @@
                 <a:latin typeface="Segoe UI" pitchFamily="34" charset="0"/>
                 <a:cs typeface="Segoe UI" pitchFamily="34" charset="0"/>
               </a:rPr>
-              <a:t>improving </a:t>
-            </a:r>
-            <a:r>
-              <a:rPr lang="en-PH" dirty="0" smtClean="0">
-                <a:latin typeface="Segoe UI" pitchFamily="34" charset="0"/>
-                <a:cs typeface="Segoe UI" pitchFamily="34" charset="0"/>
-              </a:rPr>
-              <a:t>visual appearance</a:t>
+              <a:t>improving visual appearance</a:t>
             </a:r>
           </a:p>
           <a:p>
@@ -11370,14 +11326,7 @@
                 <a:latin typeface="Segoe UI" pitchFamily="34" charset="0"/>
                 <a:cs typeface="Segoe UI" pitchFamily="34" charset="0"/>
               </a:rPr>
-              <a:t>preparing </a:t>
-            </a:r>
-            <a:r>
-              <a:rPr lang="en-PH" dirty="0" smtClean="0">
-                <a:latin typeface="Segoe UI" pitchFamily="34" charset="0"/>
-                <a:cs typeface="Segoe UI" pitchFamily="34" charset="0"/>
-              </a:rPr>
-              <a:t>images for measurement</a:t>
+              <a:t>preparing images for measurement</a:t>
             </a:r>
             <a:endParaRPr lang="en-PH" dirty="0">
               <a:latin typeface="Segoe UI" pitchFamily="34" charset="0"/>
@@ -11533,14 +11482,7 @@
                 <a:latin typeface="Segoe UI" pitchFamily="34" charset="0"/>
                 <a:cs typeface="Segoe UI" pitchFamily="34" charset="0"/>
               </a:rPr>
-              <a:t>resizing </a:t>
-            </a:r>
-            <a:r>
-              <a:rPr lang="en-PH" dirty="0" smtClean="0">
-                <a:latin typeface="Segoe UI" pitchFamily="34" charset="0"/>
-                <a:cs typeface="Segoe UI" pitchFamily="34" charset="0"/>
-              </a:rPr>
-              <a:t>(increases or decreases)</a:t>
+              <a:t>resizing (increases or decreases)</a:t>
             </a:r>
           </a:p>
           <a:p>
@@ -11924,14 +11866,7 @@
                 <a:latin typeface="Segoe UI" pitchFamily="34" charset="0"/>
                 <a:cs typeface="Segoe UI" pitchFamily="34" charset="0"/>
               </a:rPr>
-              <a:t>removal </a:t>
-            </a:r>
-            <a:r>
-              <a:rPr lang="en-PH" dirty="0" smtClean="0">
-                <a:latin typeface="Segoe UI" pitchFamily="34" charset="0"/>
-                <a:cs typeface="Segoe UI" pitchFamily="34" charset="0"/>
-              </a:rPr>
-              <a:t>of parts</a:t>
+              <a:t>removal of parts</a:t>
             </a:r>
             <a:endParaRPr lang="en-PH" dirty="0">
               <a:latin typeface="Segoe UI" pitchFamily="34" charset="0"/>
@@ -12298,28 +12233,7 @@
                 <a:latin typeface="Segoe UI" pitchFamily="34" charset="0"/>
                 <a:cs typeface="Segoe UI" pitchFamily="34" charset="0"/>
               </a:rPr>
-              <a:t>mathematical </a:t>
-            </a:r>
-            <a:r>
-              <a:rPr lang="en-PH" dirty="0" smtClean="0">
-                <a:latin typeface="Segoe UI" pitchFamily="34" charset="0"/>
-                <a:cs typeface="Segoe UI" pitchFamily="34" charset="0"/>
-              </a:rPr>
-              <a:t>or </a:t>
-            </a:r>
-            <a:r>
-              <a:rPr lang="en-PH" dirty="0" smtClean="0">
-                <a:latin typeface="Segoe UI" pitchFamily="34" charset="0"/>
-                <a:cs typeface="Segoe UI" pitchFamily="34" charset="0"/>
-              </a:rPr>
-              <a:t>numerical </a:t>
-            </a:r>
-            <a:r>
-              <a:rPr lang="en-PH" dirty="0" smtClean="0">
-                <a:latin typeface="Segoe UI" pitchFamily="34" charset="0"/>
-                <a:cs typeface="Segoe UI" pitchFamily="34" charset="0"/>
-              </a:rPr>
-              <a:t>representation</a:t>
+              <a:t>mathematical or numerical representation</a:t>
             </a:r>
           </a:p>
           <a:p>
@@ -12523,14 +12437,16 @@
                 <a:latin typeface="Segoe UI" pitchFamily="34" charset="0"/>
                 <a:cs typeface="Segoe UI" pitchFamily="34" charset="0"/>
               </a:rPr>
-              <a:t>most </a:t>
+              <a:t>most basic and well-known</a:t>
             </a:r>
+          </a:p>
+          <a:p>
             <a:r>
               <a:rPr lang="en-PH" dirty="0" smtClean="0">
                 <a:latin typeface="Segoe UI" pitchFamily="34" charset="0"/>
                 <a:cs typeface="Segoe UI" pitchFamily="34" charset="0"/>
               </a:rPr>
-              <a:t>basic and well-known</a:t>
+              <a:t>widely used</a:t>
             </a:r>
           </a:p>
           <a:p>
@@ -12539,30 +12455,7 @@
                 <a:latin typeface="Segoe UI" pitchFamily="34" charset="0"/>
                 <a:cs typeface="Segoe UI" pitchFamily="34" charset="0"/>
               </a:rPr>
-              <a:t>widely </a:t>
-            </a:r>
-            <a:r>
-              <a:rPr lang="en-PH" dirty="0" smtClean="0">
-                <a:latin typeface="Segoe UI" pitchFamily="34" charset="0"/>
-                <a:cs typeface="Segoe UI" pitchFamily="34" charset="0"/>
-              </a:rPr>
-              <a:t>used</a:t>
-            </a:r>
-          </a:p>
-          <a:p>
-            <a:r>
-              <a:rPr lang="en-PH" dirty="0" smtClean="0">
-                <a:latin typeface="Segoe UI" pitchFamily="34" charset="0"/>
-                <a:cs typeface="Segoe UI" pitchFamily="34" charset="0"/>
-              </a:rPr>
-              <a:t>fails </a:t>
-            </a:r>
-            <a:r>
-              <a:rPr lang="en-PH" dirty="0" smtClean="0">
-                <a:latin typeface="Segoe UI" pitchFamily="34" charset="0"/>
-                <a:cs typeface="Segoe UI" pitchFamily="34" charset="0"/>
-              </a:rPr>
-              <a:t>in dealing with “real world” images</a:t>
+              <a:t>fails in dealing with “real world” images</a:t>
             </a:r>
             <a:endParaRPr lang="en-PH" dirty="0">
               <a:latin typeface="Segoe UI" pitchFamily="34" charset="0"/>
@@ -12734,14 +12627,7 @@
                 <a:latin typeface="Segoe UI" pitchFamily="34" charset="0"/>
                 <a:cs typeface="Segoe UI" pitchFamily="34" charset="0"/>
               </a:rPr>
-              <a:t>more </a:t>
-            </a:r>
-            <a:r>
-              <a:rPr lang="en-PH" dirty="0" smtClean="0">
-                <a:latin typeface="Segoe UI" pitchFamily="34" charset="0"/>
-                <a:cs typeface="Segoe UI" pitchFamily="34" charset="0"/>
-              </a:rPr>
-              <a:t>“intuitive”</a:t>
+              <a:t>more “intuitive”</a:t>
             </a:r>
           </a:p>
           <a:p>
@@ -14096,14 +13982,16 @@
                 <a:latin typeface="Segoe UI" pitchFamily="34" charset="0"/>
                 <a:cs typeface="Segoe UI" pitchFamily="34" charset="0"/>
               </a:rPr>
-              <a:t>information </a:t>
+              <a:t>information processing diagram</a:t>
             </a:r>
+          </a:p>
+          <a:p>
             <a:r>
               <a:rPr lang="en-PH" dirty="0" smtClean="0">
                 <a:latin typeface="Segoe UI" pitchFamily="34" charset="0"/>
                 <a:cs typeface="Segoe UI" pitchFamily="34" charset="0"/>
               </a:rPr>
-              <a:t>processing diagram</a:t>
+              <a:t>collection of neuron</a:t>
             </a:r>
           </a:p>
           <a:p>
@@ -14112,14 +14000,16 @@
                 <a:latin typeface="Segoe UI" pitchFamily="34" charset="0"/>
                 <a:cs typeface="Segoe UI" pitchFamily="34" charset="0"/>
               </a:rPr>
-              <a:t>collection </a:t>
+              <a:t>extract patterns, detect trends</a:t>
             </a:r>
+          </a:p>
+          <a:p>
             <a:r>
               <a:rPr lang="en-PH" dirty="0" smtClean="0">
                 <a:latin typeface="Segoe UI" pitchFamily="34" charset="0"/>
                 <a:cs typeface="Segoe UI" pitchFamily="34" charset="0"/>
               </a:rPr>
-              <a:t>of neuron</a:t>
+              <a:t>superior generalization capability</a:t>
             </a:r>
           </a:p>
           <a:p>
@@ -14128,46 +14018,7 @@
                 <a:latin typeface="Segoe UI" pitchFamily="34" charset="0"/>
                 <a:cs typeface="Segoe UI" pitchFamily="34" charset="0"/>
               </a:rPr>
-              <a:t>extract </a:t>
-            </a:r>
-            <a:r>
-              <a:rPr lang="en-PH" dirty="0" smtClean="0">
-                <a:latin typeface="Segoe UI" pitchFamily="34" charset="0"/>
-                <a:cs typeface="Segoe UI" pitchFamily="34" charset="0"/>
-              </a:rPr>
-              <a:t>patterns, detect trends</a:t>
-            </a:r>
-          </a:p>
-          <a:p>
-            <a:r>
-              <a:rPr lang="en-PH" dirty="0" smtClean="0">
-                <a:latin typeface="Segoe UI" pitchFamily="34" charset="0"/>
-                <a:cs typeface="Segoe UI" pitchFamily="34" charset="0"/>
-              </a:rPr>
-              <a:t>superior </a:t>
-            </a:r>
-            <a:r>
-              <a:rPr lang="en-PH" dirty="0" smtClean="0">
-                <a:latin typeface="Segoe UI" pitchFamily="34" charset="0"/>
-                <a:cs typeface="Segoe UI" pitchFamily="34" charset="0"/>
-              </a:rPr>
-              <a:t>generalization capability</a:t>
-            </a:r>
-          </a:p>
-          <a:p>
-            <a:r>
-              <a:rPr lang="en-PH" dirty="0" smtClean="0">
-                <a:latin typeface="Segoe UI" pitchFamily="34" charset="0"/>
-                <a:cs typeface="Segoe UI" pitchFamily="34" charset="0"/>
-              </a:rPr>
-              <a:t>slow </a:t>
-            </a:r>
-            <a:r>
-              <a:rPr lang="en-PH" dirty="0" smtClean="0">
-                <a:latin typeface="Segoe UI" pitchFamily="34" charset="0"/>
-                <a:cs typeface="Segoe UI" pitchFamily="34" charset="0"/>
-              </a:rPr>
-              <a:t>learning speed</a:t>
+              <a:t>slow learning speed</a:t>
             </a:r>
             <a:endParaRPr lang="en-PH" dirty="0">
               <a:latin typeface="Segoe UI" pitchFamily="34" charset="0"/>
@@ -14481,14 +14332,7 @@
                 <a:latin typeface="Segoe UI" pitchFamily="34" charset="0"/>
                 <a:cs typeface="Segoe UI" pitchFamily="34" charset="0"/>
               </a:rPr>
-              <a:t>tries </a:t>
-            </a:r>
-            <a:r>
-              <a:rPr lang="en-PH" dirty="0" smtClean="0">
-                <a:latin typeface="Segoe UI" pitchFamily="34" charset="0"/>
-                <a:cs typeface="Segoe UI" pitchFamily="34" charset="0"/>
-              </a:rPr>
-              <a:t>to solve:</a:t>
+              <a:t>tries to solve:</a:t>
             </a:r>
           </a:p>
           <a:p>
@@ -14498,14 +14342,7 @@
                 <a:latin typeface="Segoe UI" pitchFamily="34" charset="0"/>
                 <a:cs typeface="Segoe UI" pitchFamily="34" charset="0"/>
               </a:rPr>
-              <a:t>intensive </a:t>
-            </a:r>
-            <a:r>
-              <a:rPr lang="en-PH" dirty="0" smtClean="0">
-                <a:latin typeface="Segoe UI" pitchFamily="34" charset="0"/>
-                <a:cs typeface="Segoe UI" pitchFamily="34" charset="0"/>
-              </a:rPr>
-              <a:t>human intervention</a:t>
+              <a:t>intensive human intervention</a:t>
             </a:r>
           </a:p>
           <a:p>
@@ -14515,14 +14352,7 @@
                 <a:latin typeface="Segoe UI" pitchFamily="34" charset="0"/>
                 <a:cs typeface="Segoe UI" pitchFamily="34" charset="0"/>
               </a:rPr>
-              <a:t>slow </a:t>
-            </a:r>
-            <a:r>
-              <a:rPr lang="en-PH" dirty="0" smtClean="0">
-                <a:latin typeface="Segoe UI" pitchFamily="34" charset="0"/>
-                <a:cs typeface="Segoe UI" pitchFamily="34" charset="0"/>
-              </a:rPr>
-              <a:t>learning speed</a:t>
+              <a:t>slow learning speed</a:t>
             </a:r>
           </a:p>
           <a:p>
@@ -16930,7 +16760,7 @@
         <p:spPr/>
         <p:txBody>
           <a:bodyPr>
-            <a:normAutofit fontScale="92500" lnSpcReduction="20000"/>
+            <a:normAutofit fontScale="85000" lnSpcReduction="10000"/>
           </a:bodyPr>
           <a:lstStyle/>
           <a:p>
@@ -18659,7 +18489,7 @@
         <p:spPr bwMode="auto">
           <a:xfrm>
             <a:off x="4191000" y="4810780"/>
-            <a:ext cx="4494244" cy="523220"/>
+            <a:ext cx="4630755" cy="523220"/>
           </a:xfrm>
           <a:prstGeom prst="rect">
             <a:avLst/>
@@ -18683,7 +18513,7 @@
                 <a:latin typeface="Segoe UI" pitchFamily="34" charset="0"/>
                 <a:cs typeface="Segoe UI" pitchFamily="34" charset="0"/>
               </a:rPr>
-              <a:t>Eating makes you happy </a:t>
+              <a:t>Tomato makes you happy </a:t>
             </a:r>
             <a:r>
               <a:rPr lang="en-US" sz="2800" dirty="0" smtClean="0">
@@ -20554,7 +20384,7 @@
                             </p:stCondLst>
                             <p:childTnLst>
                               <p:par>
-                                <p:cTn id="21" presetID="10" presetClass="entr" presetSubtype="0" fill="hold" grpId="0" nodeType="afterEffect">
+                                <p:cTn id="21" presetID="10" presetClass="entr" presetSubtype="0" fill="hold" nodeType="afterEffect">
                                   <p:stCondLst>
                                     <p:cond delay="0"/>
                                   </p:stCondLst>
@@ -31169,47 +30999,6 @@
           </a:p>
         </p:txBody>
       </p:sp>
-      <p:pic>
-        <p:nvPicPr>
-          <p:cNvPr id="6" name="Picture 2" descr="http://www.badnoodle.com/gallery/d/8624-2/tomato_sorting.jpg"/>
-          <p:cNvPicPr>
-            <a:picLocks noChangeAspect="1" noChangeArrowheads="1"/>
-          </p:cNvPicPr>
-          <p:nvPr/>
-        </p:nvPicPr>
-        <p:blipFill>
-          <a:blip r:embed="rId2">
-            <a:extLst>
-              <a:ext uri="{28A0092B-C50C-407E-A947-70E740481C1C}">
-                <a14:useLocalDpi xmlns:a14="http://schemas.microsoft.com/office/drawing/2010/main" xmlns="" val="0"/>
-              </a:ext>
-            </a:extLst>
-          </a:blip>
-          <a:srcRect/>
-          <a:stretch>
-            <a:fillRect/>
-          </a:stretch>
-        </p:blipFill>
-        <p:spPr bwMode="auto">
-          <a:xfrm>
-            <a:off x="457200" y="2057400"/>
-            <a:ext cx="4470399" cy="3352800"/>
-          </a:xfrm>
-          <a:prstGeom prst="rect">
-            <a:avLst/>
-          </a:prstGeom>
-          <a:noFill/>
-          <a:extLst>
-            <a:ext uri="{909E8E84-426E-40DD-AFC4-6F175D3DCCD1}">
-              <a14:hiddenFill xmlns:a14="http://schemas.microsoft.com/office/drawing/2010/main" xmlns="">
-                <a:solidFill>
-                  <a:srgbClr val="FFFFFF"/>
-                </a:solidFill>
-              </a14:hiddenFill>
-            </a:ext>
-          </a:extLst>
-        </p:spPr>
-      </p:pic>
       <p:sp>
         <p:nvSpPr>
           <p:cNvPr id="7" name="TextBox 4"/>
@@ -31294,6 +31083,32 @@
           </a:p>
         </p:txBody>
       </p:sp>
+      <p:pic>
+        <p:nvPicPr>
+          <p:cNvPr id="1026" name="Picture 2" descr="D:\My Academics\Undergraduate Research\Research - Tomato Classification\ffb634_07f5fea8e69b4f52a7d8ad310d713e19.jpg"/>
+          <p:cNvPicPr>
+            <a:picLocks noChangeAspect="1" noChangeArrowheads="1"/>
+          </p:cNvPicPr>
+          <p:nvPr/>
+        </p:nvPicPr>
+        <p:blipFill>
+          <a:blip r:embed="rId2" cstate="print"/>
+          <a:srcRect/>
+          <a:stretch>
+            <a:fillRect/>
+          </a:stretch>
+        </p:blipFill>
+        <p:spPr bwMode="auto">
+          <a:xfrm>
+            <a:off x="515540" y="1905000"/>
+            <a:ext cx="4589860" cy="3429000"/>
+          </a:xfrm>
+          <a:prstGeom prst="rect">
+            <a:avLst/>
+          </a:prstGeom>
+          <a:noFill/>
+        </p:spPr>
+      </p:pic>
     </p:spTree>
   </p:cSld>
   <p:clrMapOvr>
@@ -37110,11 +36925,25 @@
           </a:p>
           <a:p>
             <a:r>
+              <a:rPr lang="en-PH" smtClean="0">
+                <a:latin typeface="Segoe UI" pitchFamily="34" charset="0"/>
+                <a:cs typeface="Segoe UI" pitchFamily="34" charset="0"/>
+              </a:rPr>
+              <a:t>ELM </a:t>
+            </a:r>
+            <a:r>
+              <a:rPr lang="en-PH" smtClean="0">
+                <a:latin typeface="Segoe UI" pitchFamily="34" charset="0"/>
+                <a:cs typeface="Segoe UI" pitchFamily="34" charset="0"/>
+              </a:rPr>
+              <a:t>is </a:t>
+            </a:r>
+            <a:r>
               <a:rPr lang="en-PH" dirty="0" smtClean="0">
                 <a:latin typeface="Segoe UI" pitchFamily="34" charset="0"/>
                 <a:cs typeface="Segoe UI" pitchFamily="34" charset="0"/>
               </a:rPr>
-              <a:t>ELM can be an efficient method in the classification of tomatoes</a:t>
+              <a:t>an efficient method in the classification of tomatoes</a:t>
             </a:r>
           </a:p>
           <a:p>
@@ -37425,21 +37254,7 @@
                 <a:latin typeface="Segoe UI" pitchFamily="34" charset="0"/>
                 <a:cs typeface="Segoe UI" pitchFamily="34" charset="0"/>
               </a:rPr>
-              <a:t>time </a:t>
-            </a:r>
-            <a:r>
-              <a:rPr lang="en-PH" dirty="0" smtClean="0">
-                <a:latin typeface="Segoe UI" pitchFamily="34" charset="0"/>
-                <a:cs typeface="Segoe UI" pitchFamily="34" charset="0"/>
-              </a:rPr>
-              <a:t>consuming, </a:t>
-            </a:r>
-            <a:r>
-              <a:rPr lang="en-PH" dirty="0" smtClean="0">
-                <a:latin typeface="Segoe UI" pitchFamily="34" charset="0"/>
-                <a:cs typeface="Segoe UI" pitchFamily="34" charset="0"/>
-              </a:rPr>
-              <a:t>tedious, expensive</a:t>
+              <a:t>time consuming, tedious, expensive</a:t>
             </a:r>
           </a:p>
           <a:p>
@@ -37450,10 +37265,6 @@
               </a:rPr>
               <a:t>brightness, vividness</a:t>
             </a:r>
-            <a:endParaRPr lang="en-PH" dirty="0" smtClean="0">
-              <a:latin typeface="Segoe UI" pitchFamily="34" charset="0"/>
-              <a:cs typeface="Segoe UI" pitchFamily="34" charset="0"/>
-            </a:endParaRPr>
           </a:p>
           <a:p>
             <a:r>
@@ -37463,10 +37274,6 @@
               </a:rPr>
               <a:t>save time and expense</a:t>
             </a:r>
-            <a:endParaRPr lang="en-PH" dirty="0" smtClean="0">
-              <a:latin typeface="Segoe UI" pitchFamily="34" charset="0"/>
-              <a:cs typeface="Segoe UI" pitchFamily="34" charset="0"/>
-            </a:endParaRPr>
           </a:p>
           <a:p>
             <a:r>
@@ -37474,14 +37281,7 @@
                 <a:latin typeface="Segoe UI" pitchFamily="34" charset="0"/>
                 <a:cs typeface="Segoe UI" pitchFamily="34" charset="0"/>
               </a:rPr>
-              <a:t>improved </a:t>
-            </a:r>
-            <a:r>
-              <a:rPr lang="en-PH" dirty="0" smtClean="0">
-                <a:latin typeface="Segoe UI" pitchFamily="34" charset="0"/>
-                <a:cs typeface="Segoe UI" pitchFamily="34" charset="0"/>
-              </a:rPr>
-              <a:t>quality, abolish inconsistency, reduce dependence</a:t>
+              <a:t>improved quality, abolish inconsistency, reduce dependence</a:t>
             </a:r>
           </a:p>
         </p:txBody>
@@ -37723,14 +37523,7 @@
                 <a:latin typeface="Segoe UI" pitchFamily="34" charset="0"/>
                 <a:cs typeface="Segoe UI" pitchFamily="34" charset="0"/>
               </a:rPr>
-              <a:t>Digita</a:t>
-            </a:r>
-            <a:r>
-              <a:rPr lang="en-PH" dirty="0" smtClean="0">
-                <a:latin typeface="Segoe UI" pitchFamily="34" charset="0"/>
-                <a:cs typeface="Segoe UI" pitchFamily="34" charset="0"/>
-              </a:rPr>
-              <a:t>l Image</a:t>
+              <a:t>Digital Image</a:t>
             </a:r>
           </a:p>
           <a:p>
@@ -37766,10 +37559,6 @@
               </a:rPr>
               <a:t>Machine Learning </a:t>
             </a:r>
-            <a:endParaRPr lang="en-PH" dirty="0" smtClean="0">
-              <a:latin typeface="Segoe UI" pitchFamily="34" charset="0"/>
-              <a:cs typeface="Segoe UI" pitchFamily="34" charset="0"/>
-            </a:endParaRPr>
           </a:p>
         </p:txBody>
       </p:sp>
@@ -37836,23 +37625,7 @@
                 <a:ea typeface="Segoe UI Symbol" pitchFamily="34" charset="0"/>
                 <a:cs typeface="Consolas" pitchFamily="49" charset="0"/>
               </a:rPr>
-              <a:t>	</a:t>
-            </a:r>
-            <a:r>
-              <a:rPr lang="en-PH" sz="4000" dirty="0" smtClean="0">
-                <a:latin typeface="Consolas" pitchFamily="49" charset="0"/>
-                <a:ea typeface="Segoe UI Symbol" pitchFamily="34" charset="0"/>
-                <a:cs typeface="Consolas" pitchFamily="49" charset="0"/>
-              </a:rPr>
-              <a:t>How to </a:t>
-            </a:r>
-            <a:r>
-              <a:rPr lang="en-PH" sz="4000" dirty="0" smtClean="0">
-                <a:latin typeface="Consolas" pitchFamily="49" charset="0"/>
-                <a:ea typeface="Segoe UI Symbol" pitchFamily="34" charset="0"/>
-                <a:cs typeface="Consolas" pitchFamily="49" charset="0"/>
-              </a:rPr>
-              <a:t>Automate?</a:t>
+              <a:t>	How to Automate?</a:t>
             </a:r>
             <a:endParaRPr lang="en-PH" sz="4000" dirty="0">
               <a:latin typeface="Consolas" pitchFamily="49" charset="0"/>
@@ -37917,30 +37690,16 @@
                 <a:latin typeface="Segoe UI" pitchFamily="34" charset="0"/>
                 <a:cs typeface="Segoe UI" pitchFamily="34" charset="0"/>
               </a:rPr>
-              <a:t>electronic </a:t>
+              <a:t>electronic representation</a:t>
             </a:r>
+          </a:p>
+          <a:p>
             <a:r>
               <a:rPr lang="en-PH" dirty="0" smtClean="0">
                 <a:latin typeface="Segoe UI" pitchFamily="34" charset="0"/>
                 <a:cs typeface="Segoe UI" pitchFamily="34" charset="0"/>
               </a:rPr>
-              <a:t>representation</a:t>
-            </a:r>
-          </a:p>
-          <a:p>
-            <a:r>
-              <a:rPr lang="en-PH" dirty="0" smtClean="0">
-                <a:latin typeface="Segoe UI" pitchFamily="34" charset="0"/>
-                <a:cs typeface="Segoe UI" pitchFamily="34" charset="0"/>
-              </a:rPr>
-              <a:t>composed </a:t>
-            </a:r>
-            <a:r>
-              <a:rPr lang="en-PH" dirty="0" smtClean="0">
-                <a:latin typeface="Segoe UI" pitchFamily="34" charset="0"/>
-                <a:cs typeface="Segoe UI" pitchFamily="34" charset="0"/>
-              </a:rPr>
-              <a:t>of pixels</a:t>
+              <a:t>composed of pixels</a:t>
             </a:r>
             <a:endParaRPr lang="en-PH" dirty="0">
               <a:latin typeface="Segoe UI" pitchFamily="34" charset="0"/>

</xml_diff>